<commit_message>
Made changes to Dev Guide Ui component
</commit_message>
<xml_diff>
--- a/docs/diagrams/UiComponentClassDiagram.pptx
+++ b/docs/diagrams/UiComponentClassDiagram.pptx
@@ -208,7 +208,7 @@
           <a:p>
             <a:fld id="{F5CC4B3F-88C1-4FFA-B1B6-F41C21DC6924}" type="datetimeFigureOut">
               <a:rPr lang="en-US" smtClean="0"/>
-              <a:t>3/15/2017</a:t>
+              <a:t>4/9/2017</a:t>
             </a:fld>
             <a:endParaRPr lang="en-US"/>
           </a:p>
@@ -654,7 +654,7 @@
           <a:p>
             <a:fld id="{78C97017-6FC3-485B-9764-EAC9E56C1D49}" type="datetimeFigureOut">
               <a:rPr lang="en-US" smtClean="0"/>
-              <a:t>3/15/2017</a:t>
+              <a:t>4/9/2017</a:t>
             </a:fld>
             <a:endParaRPr lang="en-US"/>
           </a:p>
@@ -822,7 +822,7 @@
           <a:p>
             <a:fld id="{78C97017-6FC3-485B-9764-EAC9E56C1D49}" type="datetimeFigureOut">
               <a:rPr lang="en-US" smtClean="0"/>
-              <a:t>3/15/2017</a:t>
+              <a:t>4/9/2017</a:t>
             </a:fld>
             <a:endParaRPr lang="en-US"/>
           </a:p>
@@ -1000,7 +1000,7 @@
           <a:p>
             <a:fld id="{78C97017-6FC3-485B-9764-EAC9E56C1D49}" type="datetimeFigureOut">
               <a:rPr lang="en-US" smtClean="0"/>
-              <a:t>3/15/2017</a:t>
+              <a:t>4/9/2017</a:t>
             </a:fld>
             <a:endParaRPr lang="en-US"/>
           </a:p>
@@ -1168,7 +1168,7 @@
           <a:p>
             <a:fld id="{78C97017-6FC3-485B-9764-EAC9E56C1D49}" type="datetimeFigureOut">
               <a:rPr lang="en-US" smtClean="0"/>
-              <a:t>3/15/2017</a:t>
+              <a:t>4/9/2017</a:t>
             </a:fld>
             <a:endParaRPr lang="en-US"/>
           </a:p>
@@ -1413,7 +1413,7 @@
           <a:p>
             <a:fld id="{78C97017-6FC3-485B-9764-EAC9E56C1D49}" type="datetimeFigureOut">
               <a:rPr lang="en-US" smtClean="0"/>
-              <a:t>3/15/2017</a:t>
+              <a:t>4/9/2017</a:t>
             </a:fld>
             <a:endParaRPr lang="en-US"/>
           </a:p>
@@ -1698,7 +1698,7 @@
           <a:p>
             <a:fld id="{78C97017-6FC3-485B-9764-EAC9E56C1D49}" type="datetimeFigureOut">
               <a:rPr lang="en-US" smtClean="0"/>
-              <a:t>3/15/2017</a:t>
+              <a:t>4/9/2017</a:t>
             </a:fld>
             <a:endParaRPr lang="en-US"/>
           </a:p>
@@ -2117,7 +2117,7 @@
           <a:p>
             <a:fld id="{78C97017-6FC3-485B-9764-EAC9E56C1D49}" type="datetimeFigureOut">
               <a:rPr lang="en-US" smtClean="0"/>
-              <a:t>3/15/2017</a:t>
+              <a:t>4/9/2017</a:t>
             </a:fld>
             <a:endParaRPr lang="en-US"/>
           </a:p>
@@ -2234,7 +2234,7 @@
           <a:p>
             <a:fld id="{78C97017-6FC3-485B-9764-EAC9E56C1D49}" type="datetimeFigureOut">
               <a:rPr lang="en-US" smtClean="0"/>
-              <a:t>3/15/2017</a:t>
+              <a:t>4/9/2017</a:t>
             </a:fld>
             <a:endParaRPr lang="en-US"/>
           </a:p>
@@ -2329,7 +2329,7 @@
           <a:p>
             <a:fld id="{78C97017-6FC3-485B-9764-EAC9E56C1D49}" type="datetimeFigureOut">
               <a:rPr lang="en-US" smtClean="0"/>
-              <a:t>3/15/2017</a:t>
+              <a:t>4/9/2017</a:t>
             </a:fld>
             <a:endParaRPr lang="en-US"/>
           </a:p>
@@ -2604,7 +2604,7 @@
           <a:p>
             <a:fld id="{78C97017-6FC3-485B-9764-EAC9E56C1D49}" type="datetimeFigureOut">
               <a:rPr lang="en-US" smtClean="0"/>
-              <a:t>3/15/2017</a:t>
+              <a:t>4/9/2017</a:t>
             </a:fld>
             <a:endParaRPr lang="en-US"/>
           </a:p>
@@ -2856,7 +2856,7 @@
           <a:p>
             <a:fld id="{78C97017-6FC3-485B-9764-EAC9E56C1D49}" type="datetimeFigureOut">
               <a:rPr lang="en-US" smtClean="0"/>
-              <a:t>3/15/2017</a:t>
+              <a:t>4/9/2017</a:t>
             </a:fld>
             <a:endParaRPr lang="en-US"/>
           </a:p>
@@ -3067,7 +3067,7 @@
           <a:p>
             <a:fld id="{78C97017-6FC3-485B-9764-EAC9E56C1D49}" type="datetimeFigureOut">
               <a:rPr lang="en-US" smtClean="0"/>
-              <a:t>3/15/2017</a:t>
+              <a:t>4/9/2017</a:t>
             </a:fld>
             <a:endParaRPr lang="en-US"/>
           </a:p>
@@ -3879,13 +3879,13 @@
       </p:sp>
       <p:sp>
         <p:nvSpPr>
-          <p:cNvPr id="34" name="Rectangle 11"/>
+          <p:cNvPr id="35" name="Rectangle 11"/>
           <p:cNvSpPr/>
           <p:nvPr/>
         </p:nvSpPr>
         <p:spPr>
           <a:xfrm>
-            <a:off x="2592528" y="3649359"/>
+            <a:off x="2592527" y="4563759"/>
             <a:ext cx="1093635" cy="236841"/>
           </a:xfrm>
           <a:prstGeom prst="rect">
@@ -3925,7 +3925,7 @@
                   </a:schemeClr>
                 </a:solidFill>
               </a:rPr>
-              <a:t>BrowserPanel</a:t>
+              <a:t>StatusBarFooter</a:t>
             </a:r>
             <a:endParaRPr lang="en-SG" sz="1050" b="1" dirty="0">
               <a:solidFill>
@@ -3939,73 +3939,13 @@
       </p:sp>
       <p:sp>
         <p:nvSpPr>
-          <p:cNvPr id="35" name="Rectangle 11"/>
-          <p:cNvSpPr/>
-          <p:nvPr/>
-        </p:nvSpPr>
-        <p:spPr>
-          <a:xfrm>
-            <a:off x="2592527" y="4563759"/>
-            <a:ext cx="1093635" cy="236841"/>
-          </a:xfrm>
-          <a:prstGeom prst="rect">
-            <a:avLst/>
-          </a:prstGeom>
-          <a:ln w="19050">
-            <a:solidFill>
-              <a:schemeClr val="accent3"/>
-            </a:solidFill>
-          </a:ln>
-          <a:effectLst/>
-        </p:spPr>
-        <p:style>
-          <a:lnRef idx="1">
-            <a:schemeClr val="accent3"/>
-          </a:lnRef>
-          <a:fillRef idx="2">
-            <a:schemeClr val="accent3"/>
-          </a:fillRef>
-          <a:effectRef idx="1">
-            <a:schemeClr val="accent3"/>
-          </a:effectRef>
-          <a:fontRef idx="minor">
-            <a:schemeClr val="dk1"/>
-          </a:fontRef>
-        </p:style>
-        <p:txBody>
-          <a:bodyPr rtlCol="0" anchor="ctr"/>
-          <a:lstStyle/>
-          <a:p>
-            <a:pPr algn="ctr"/>
-            <a:r>
-              <a:rPr lang="en-US" sz="1050" b="1" dirty="0" err="1">
-                <a:solidFill>
-                  <a:schemeClr val="accent3">
-                    <a:lumMod val="75000"/>
-                  </a:schemeClr>
-                </a:solidFill>
-              </a:rPr>
-              <a:t>StatusBarFooter</a:t>
-            </a:r>
-            <a:endParaRPr lang="en-SG" sz="1050" b="1" dirty="0">
-              <a:solidFill>
-                <a:schemeClr val="accent3">
-                  <a:lumMod val="75000"/>
-                </a:schemeClr>
-              </a:solidFill>
-            </a:endParaRPr>
-          </a:p>
-        </p:txBody>
-      </p:sp>
-      <p:sp>
-        <p:nvSpPr>
           <p:cNvPr id="36" name="Rectangle 11"/>
           <p:cNvSpPr/>
           <p:nvPr/>
         </p:nvSpPr>
         <p:spPr>
           <a:xfrm>
-            <a:off x="2592526" y="3991960"/>
+            <a:off x="2592526" y="3877959"/>
             <a:ext cx="1093635" cy="236841"/>
           </a:xfrm>
           <a:prstGeom prst="rect">
@@ -4274,7 +4214,7 @@
         </p:nvSpPr>
         <p:spPr>
           <a:xfrm>
-            <a:off x="2590799" y="3304308"/>
+            <a:off x="2590799" y="3420759"/>
             <a:ext cx="1095361" cy="236841"/>
           </a:xfrm>
           <a:prstGeom prst="rect">
@@ -4328,47 +4268,6 @@
       </p:sp>
       <p:cxnSp>
         <p:nvCxnSpPr>
-          <p:cNvPr id="44" name="Elbow Connector 63"/>
-          <p:cNvCxnSpPr>
-            <a:stCxn id="39" idx="2"/>
-            <a:endCxn id="34" idx="1"/>
-          </p:cNvCxnSpPr>
-          <p:nvPr/>
-        </p:nvCxnSpPr>
-        <p:spPr>
-          <a:xfrm rot="16200000" flipH="1">
-            <a:off x="2054450" y="3229701"/>
-            <a:ext cx="899755" cy="176402"/>
-          </a:xfrm>
-          <a:prstGeom prst="bentConnector2">
-            <a:avLst/>
-          </a:prstGeom>
-          <a:ln w="19050">
-            <a:solidFill>
-              <a:schemeClr val="accent3"/>
-            </a:solidFill>
-            <a:headEnd type="none" w="med" len="med"/>
-            <a:tailEnd type="arrow" w="med" len="med"/>
-          </a:ln>
-          <a:effectLst/>
-        </p:spPr>
-        <p:style>
-          <a:lnRef idx="1">
-            <a:schemeClr val="accent2"/>
-          </a:lnRef>
-          <a:fillRef idx="2">
-            <a:schemeClr val="accent2"/>
-          </a:fillRef>
-          <a:effectRef idx="1">
-            <a:schemeClr val="accent2"/>
-          </a:effectRef>
-          <a:fontRef idx="minor">
-            <a:schemeClr val="dk1"/>
-          </a:fontRef>
-        </p:style>
-      </p:cxnSp>
-      <p:cxnSp>
-        <p:nvCxnSpPr>
           <p:cNvPr id="47" name="Elbow Connector 63"/>
           <p:cNvCxnSpPr>
             <a:stCxn id="39" idx="2"/>
@@ -4378,8 +4277,8 @@
         </p:nvCxnSpPr>
         <p:spPr>
           <a:xfrm rot="16200000" flipH="1">
-            <a:off x="1883148" y="3401003"/>
-            <a:ext cx="1242356" cy="176400"/>
+            <a:off x="1940149" y="3344002"/>
+            <a:ext cx="1128355" cy="176400"/>
           </a:xfrm>
           <a:prstGeom prst="bentConnector2">
             <a:avLst/>
@@ -4580,7 +4479,7 @@
         <p:spPr>
           <a:xfrm flipV="1">
             <a:off x="3686160" y="2286000"/>
-            <a:ext cx="1843809" cy="1136729"/>
+            <a:ext cx="1843809" cy="1253180"/>
           </a:xfrm>
           <a:prstGeom prst="bentConnector2">
             <a:avLst/>
@@ -4652,47 +4551,6 @@
       </p:cxnSp>
       <p:cxnSp>
         <p:nvCxnSpPr>
-          <p:cNvPr id="82" name="Elbow Connector 63"/>
-          <p:cNvCxnSpPr>
-            <a:stCxn id="16" idx="3"/>
-            <a:endCxn id="34" idx="3"/>
-          </p:cNvCxnSpPr>
-          <p:nvPr/>
-        </p:nvCxnSpPr>
-        <p:spPr>
-          <a:xfrm rot="5400000">
-            <a:off x="3867176" y="2104987"/>
-            <a:ext cx="1481780" cy="1843806"/>
-          </a:xfrm>
-          <a:prstGeom prst="bentConnector2">
-            <a:avLst/>
-          </a:prstGeom>
-          <a:ln w="6350">
-            <a:solidFill>
-              <a:schemeClr val="accent3"/>
-            </a:solidFill>
-            <a:headEnd type="none" w="med" len="med"/>
-            <a:tailEnd type="none" w="med" len="med"/>
-          </a:ln>
-          <a:effectLst/>
-        </p:spPr>
-        <p:style>
-          <a:lnRef idx="1">
-            <a:schemeClr val="accent2"/>
-          </a:lnRef>
-          <a:fillRef idx="2">
-            <a:schemeClr val="accent2"/>
-          </a:fillRef>
-          <a:effectRef idx="1">
-            <a:schemeClr val="accent2"/>
-          </a:effectRef>
-          <a:fontRef idx="minor">
-            <a:schemeClr val="dk1"/>
-          </a:fontRef>
-        </p:style>
-      </p:cxnSp>
-      <p:cxnSp>
-        <p:nvCxnSpPr>
           <p:cNvPr id="88" name="Elbow Connector 63"/>
           <p:cNvCxnSpPr>
             <a:stCxn id="2" idx="3"/>
@@ -5086,8 +4944,8 @@
         </p:nvCxnSpPr>
         <p:spPr>
           <a:xfrm rot="16200000" flipH="1">
-            <a:off x="2226110" y="3058040"/>
-            <a:ext cx="554704" cy="174673"/>
+            <a:off x="2167885" y="3116265"/>
+            <a:ext cx="671155" cy="174673"/>
           </a:xfrm>
           <a:prstGeom prst="bentConnector2">
             <a:avLst/>
@@ -5168,8 +5026,8 @@
         </p:nvCxnSpPr>
         <p:spPr>
           <a:xfrm rot="16200000" flipH="1">
-            <a:off x="3430123" y="3938021"/>
-            <a:ext cx="118421" cy="699979"/>
+            <a:off x="3373122" y="3881021"/>
+            <a:ext cx="232422" cy="699979"/>
           </a:xfrm>
           <a:prstGeom prst="bentConnector2">
             <a:avLst/>
@@ -5209,8 +5067,8 @@
         </p:nvCxnSpPr>
         <p:spPr>
           <a:xfrm rot="5400000">
-            <a:off x="3695875" y="2276286"/>
-            <a:ext cx="1824381" cy="1843808"/>
+            <a:off x="3752875" y="2219286"/>
+            <a:ext cx="1710380" cy="1843808"/>
           </a:xfrm>
           <a:prstGeom prst="bentConnector2">
             <a:avLst/>

</xml_diff>